<commit_message>
Made some quck changes to the forms and fixed navigation issue.
</commit_message>
<xml_diff>
--- a/RevanTeamProject/Documentation/SprintPowerPoint/Sprint6.pptx
+++ b/RevanTeamProject/Documentation/SprintPowerPoint/Sprint6.pptx
@@ -10127,21 +10127,21 @@
           <a:p>
             <a:r>
               <a:rPr lang="en-US" dirty="0"/>
-              <a:t>- Added Sign in</a:t>
+              <a:t>- Added Sign in directory</a:t>
             </a:r>
             <a:br>
               <a:rPr lang="en-US" dirty="0"/>
             </a:br>
             <a:r>
               <a:rPr lang="en-US" dirty="0"/>
-              <a:t>- Emails Now getting Sent</a:t>
+              <a:t>- Emails getting Sent</a:t>
             </a:r>
             <a:br>
               <a:rPr lang="en-US" dirty="0"/>
             </a:br>
             <a:r>
               <a:rPr lang="en-US" dirty="0"/>
-              <a:t>- Route Modal On Home page</a:t>
+              <a:t>- Route schedule On Home page</a:t>
             </a:r>
             <a:br>
               <a:rPr lang="en-US" dirty="0"/>
@@ -10155,7 +10155,7 @@
             </a:br>
             <a:r>
               <a:rPr lang="en-US" dirty="0"/>
-              <a:t>- Fixed Misc. styling</a:t>
+              <a:t>- update user experience</a:t>
             </a:r>
           </a:p>
         </p:txBody>
@@ -10555,7 +10555,7 @@
                 <a:ea typeface="+mj-ea"/>
                 <a:cs typeface="+mj-cs"/>
               </a:rPr>
-              <a:t>- Route Modal On Home page</a:t>
+              <a:t>- Route schedule On Home page</a:t>
             </a:r>
             <a:br>
               <a:rPr kumimoji="0" lang="en-US" sz="2800" b="0" i="0" u="none" strike="noStrike" kern="1200" cap="all" spc="150" normalizeH="0" baseline="0" noProof="0" dirty="0">

</xml_diff>

<commit_message>
Sprint 6 pushed to repo
</commit_message>
<xml_diff>
--- a/RevanTeamProject/Documentation/SprintPowerPoint/Sprint6.pptx
+++ b/RevanTeamProject/Documentation/SprintPowerPoint/Sprint6.pptx
@@ -10127,21 +10127,21 @@
           <a:p>
             <a:r>
               <a:rPr lang="en-US" dirty="0"/>
-              <a:t>- Added Sign in directory</a:t>
+              <a:t>- Added Sign in</a:t>
             </a:r>
             <a:br>
               <a:rPr lang="en-US" dirty="0"/>
             </a:br>
             <a:r>
               <a:rPr lang="en-US" dirty="0"/>
-              <a:t>- Emails getting Sent</a:t>
+              <a:t>- Emails Now getting Sent</a:t>
             </a:r>
             <a:br>
               <a:rPr lang="en-US" dirty="0"/>
             </a:br>
             <a:r>
               <a:rPr lang="en-US" dirty="0"/>
-              <a:t>- Route schedule On Home page</a:t>
+              <a:t>- Route Modal On Home page</a:t>
             </a:r>
             <a:br>
               <a:rPr lang="en-US" dirty="0"/>
@@ -10155,7 +10155,7 @@
             </a:br>
             <a:r>
               <a:rPr lang="en-US" dirty="0"/>
-              <a:t>- update user experience</a:t>
+              <a:t>- Fixed Misc. styling</a:t>
             </a:r>
           </a:p>
         </p:txBody>
@@ -10555,7 +10555,7 @@
                 <a:ea typeface="+mj-ea"/>
                 <a:cs typeface="+mj-cs"/>
               </a:rPr>
-              <a:t>- Route schedule On Home page</a:t>
+              <a:t>- Route Modal On Home page</a:t>
             </a:r>
             <a:br>
               <a:rPr kumimoji="0" lang="en-US" sz="2800" b="0" i="0" u="none" strike="noStrike" kern="1200" cap="all" spc="150" normalizeH="0" baseline="0" noProof="0" dirty="0">

</xml_diff>